<commit_message>
# RDV chez le dentiste
</commit_message>
<xml_diff>
--- a/content/post/template_rstudio_article_off.pptx
+++ b/content/post/template_rstudio_article_off.pptx
@@ -227,7 +227,7 @@
           <a:p>
             <a:fld id="{97D9A1BA-3B71-4204-B564-DAF178BB8FA2}" type="datetimeFigureOut">
               <a:rPr lang="fr-FR" smtClean="0"/>
-              <a:t>10/07/2020</a:t>
+              <a:t>15/07/2020</a:t>
             </a:fld>
             <a:endParaRPr lang="fr-FR"/>
           </a:p>
@@ -408,7 +408,7 @@
           <a:p>
             <a:fld id="{09D539D4-D68A-4633-AE87-63C75E253848}" type="datetimeFigureOut">
               <a:rPr lang="fr-FR" smtClean="0"/>
-              <a:t>10/07/2020</a:t>
+              <a:t>15/07/2020</a:t>
             </a:fld>
             <a:endParaRPr lang="fr-FR"/>
           </a:p>
@@ -9356,7 +9356,7 @@
           </a:bodyPr>
           <a:lstStyle>
             <a:lvl1pPr algn="r">
-              <a:defRPr sz="5000" spc="200" baseline="0"/>
+              <a:defRPr sz="4800" spc="200" baseline="0"/>
             </a:lvl1pPr>
           </a:lstStyle>
           <a:p>
@@ -9396,6 +9396,9 @@
               <a:spcBef>
                 <a:spcPts val="0"/>
               </a:spcBef>
+              <a:spcAft>
+                <a:spcPts val="0"/>
+              </a:spcAft>
               <a:buNone/>
               <a:defRPr sz="1800">
                 <a:solidFill>

</xml_diff>

<commit_message>
# l'article avance mais je suis bloquée au moment de l'envoi de mail...
</commit_message>
<xml_diff>
--- a/content/post/template_rstudio_article_off.pptx
+++ b/content/post/template_rstudio_article_off.pptx
@@ -227,7 +227,7 @@
           <a:p>
             <a:fld id="{97D9A1BA-3B71-4204-B564-DAF178BB8FA2}" type="datetimeFigureOut">
               <a:rPr lang="fr-FR" smtClean="0"/>
-              <a:t>15/07/2020</a:t>
+              <a:t>16/07/2020</a:t>
             </a:fld>
             <a:endParaRPr lang="fr-FR"/>
           </a:p>
@@ -408,7 +408,7 @@
           <a:p>
             <a:fld id="{09D539D4-D68A-4633-AE87-63C75E253848}" type="datetimeFigureOut">
               <a:rPr lang="fr-FR" smtClean="0"/>
-              <a:t>15/07/2020</a:t>
+              <a:t>16/07/2020</a:t>
             </a:fld>
             <a:endParaRPr lang="fr-FR"/>
           </a:p>
@@ -677,7 +677,7 @@
 </file>
 
 <file path=ppt/slideLayouts/slideLayout1.xml><?xml version="1.0" encoding="utf-8"?>
-<p:sldLayout xmlns:a="http://schemas.openxmlformats.org/drawingml/2006/main" xmlns:r="http://schemas.openxmlformats.org/officeDocument/2006/relationships" xmlns:p="http://schemas.openxmlformats.org/presentationml/2006/main" showMasterSp="0" type="title" preserve="1">
+<p:sldLayout xmlns:a="http://schemas.openxmlformats.org/drawingml/2006/main" xmlns:r="http://schemas.openxmlformats.org/officeDocument/2006/relationships" xmlns:p="http://schemas.openxmlformats.org/presentationml/2006/main" showMasterSp="0" preserve="1" userDrawn="1">
   <p:cSld name="Diapositive de titre">
     <p:spTree>
       <p:nvGrpSpPr>
@@ -9363,89 +9363,6 @@
             <a:r>
               <a:rPr lang="fr-FR" dirty="0"/>
               <a:t>Identité du pingouin</a:t>
-            </a:r>
-            <a:endParaRPr lang="en-US" dirty="0"/>
-          </a:p>
-        </p:txBody>
-      </p:sp>
-      <p:sp>
-        <p:nvSpPr>
-          <p:cNvPr id="3" name="Subtitle 2"/>
-          <p:cNvSpPr>
-            <a:spLocks noGrp="1"/>
-          </p:cNvSpPr>
-          <p:nvPr>
-            <p:ph type="subTitle" idx="1" hasCustomPrompt="1"/>
-          </p:nvPr>
-        </p:nvSpPr>
-        <p:spPr>
-          <a:xfrm>
-            <a:off x="8610600" y="4960137"/>
-            <a:ext cx="3200400" cy="1463040"/>
-          </a:xfrm>
-        </p:spPr>
-        <p:txBody>
-          <a:bodyPr lIns="91440" rIns="91440" anchor="ctr">
-            <a:normAutofit/>
-          </a:bodyPr>
-          <a:lstStyle>
-            <a:lvl1pPr marL="0" indent="0" algn="l">
-              <a:lnSpc>
-                <a:spcPct val="100000"/>
-              </a:lnSpc>
-              <a:spcBef>
-                <a:spcPts val="0"/>
-              </a:spcBef>
-              <a:spcAft>
-                <a:spcPts val="0"/>
-              </a:spcAft>
-              <a:buNone/>
-              <a:defRPr sz="1800">
-                <a:solidFill>
-                  <a:schemeClr val="tx1">
-                    <a:lumMod val="95000"/>
-                    <a:lumOff val="5000"/>
-                  </a:schemeClr>
-                </a:solidFill>
-              </a:defRPr>
-            </a:lvl1pPr>
-            <a:lvl2pPr marL="457200" indent="0" algn="ctr">
-              <a:buNone/>
-              <a:defRPr sz="1800"/>
-            </a:lvl2pPr>
-            <a:lvl3pPr marL="914400" indent="0" algn="ctr">
-              <a:buNone/>
-              <a:defRPr sz="1800"/>
-            </a:lvl3pPr>
-            <a:lvl4pPr marL="1371600" indent="0" algn="ctr">
-              <a:buNone/>
-              <a:defRPr sz="1800"/>
-            </a:lvl4pPr>
-            <a:lvl5pPr marL="1828800" indent="0" algn="ctr">
-              <a:buNone/>
-              <a:defRPr sz="1800"/>
-            </a:lvl5pPr>
-            <a:lvl6pPr marL="2286000" indent="0" algn="ctr">
-              <a:buNone/>
-              <a:defRPr sz="1800"/>
-            </a:lvl6pPr>
-            <a:lvl7pPr marL="2743200" indent="0" algn="ctr">
-              <a:buNone/>
-              <a:defRPr sz="1800"/>
-            </a:lvl7pPr>
-            <a:lvl8pPr marL="3200400" indent="0" algn="ctr">
-              <a:buNone/>
-              <a:defRPr sz="1800"/>
-            </a:lvl8pPr>
-            <a:lvl9pPr marL="3657600" indent="0" algn="ctr">
-              <a:buNone/>
-              <a:defRPr sz="1800"/>
-            </a:lvl9pPr>
-          </a:lstStyle>
-          <a:p>
-            <a:r>
-              <a:rPr lang="fr-FR" dirty="0"/>
-              <a:t>Année et première ou deuxième portée</a:t>
             </a:r>
             <a:endParaRPr lang="en-US" dirty="0"/>
           </a:p>
@@ -9530,6 +9447,42 @@
               </a:rPr>
               <a:t>Evolution du poids du pingouin</a:t>
             </a:r>
+          </a:p>
+        </p:txBody>
+      </p:sp>
+      <p:sp>
+        <p:nvSpPr>
+          <p:cNvPr id="5" name="Espace réservé du tableau 4">
+            <a:extLst>
+              <a:ext uri="{FF2B5EF4-FFF2-40B4-BE49-F238E27FC236}">
+                <a16:creationId xmlns:a16="http://schemas.microsoft.com/office/drawing/2014/main" id="{23E1F9F0-2766-46FE-BB90-678439DA78BC}"/>
+              </a:ext>
+            </a:extLst>
+          </p:cNvPr>
+          <p:cNvSpPr>
+            <a:spLocks noGrp="1"/>
+          </p:cNvSpPr>
+          <p:nvPr>
+            <p:ph type="tbl" sz="quarter" idx="10"/>
+          </p:nvPr>
+        </p:nvSpPr>
+        <p:spPr>
+          <a:xfrm>
+            <a:off x="8509000" y="5264106"/>
+            <a:ext cx="3225800" cy="397032"/>
+          </a:xfrm>
+        </p:spPr>
+        <p:txBody>
+          <a:bodyPr>
+            <a:spAutoFit/>
+          </a:bodyPr>
+          <a:lstStyle>
+            <a:lvl1pPr algn="ctr">
+              <a:defRPr/>
+            </a:lvl1pPr>
+          </a:lstStyle>
+          <a:p>
+            <a:endParaRPr lang="fr-FR" dirty="0"/>
           </a:p>
         </p:txBody>
       </p:sp>
@@ -10616,7 +10569,131 @@
                 </a:solidFill>
                 <a:latin typeface="+mj-lt"/>
               </a:rPr>
-              <a:t>CETTE PRÉSENTATION VOUS A DONNÉE DES IDÉES, DES ENVIES ???</a:t>
+              <a:t>CETTE PRÉSENTATION VOUS A DONNÉ DES IDÉES, DES ENVIES ???</a:t>
+            </a:r>
+          </a:p>
+        </p:txBody>
+      </p:sp>
+      <p:pic>
+        <p:nvPicPr>
+          <p:cNvPr id="8" name="Graphique 7" descr="Flèche : demi-tour horizontal">
+            <a:extLst>
+              <a:ext uri="{FF2B5EF4-FFF2-40B4-BE49-F238E27FC236}">
+                <a16:creationId xmlns:a16="http://schemas.microsoft.com/office/drawing/2014/main" id="{2FD2357B-7145-4C0F-B0DC-3303653F0F0F}"/>
+              </a:ext>
+            </a:extLst>
+          </p:cNvPr>
+          <p:cNvPicPr>
+            <a:picLocks noChangeAspect="1"/>
+          </p:cNvPicPr>
+          <p:nvPr userDrawn="1"/>
+        </p:nvPicPr>
+        <p:blipFill>
+          <a:blip r:embed="rId6">
+            <a:extLst>
+              <a:ext uri="{28A0092B-C50C-407E-A947-70E740481C1C}">
+                <a14:useLocalDpi xmlns:a14="http://schemas.microsoft.com/office/drawing/2010/main" val="0"/>
+              </a:ext>
+              <a:ext uri="{96DAC541-7B7A-43D3-8B79-37D633B846F1}">
+                <asvg:svgBlip xmlns:asvg="http://schemas.microsoft.com/office/drawing/2016/SVG/main" r:embed="rId7"/>
+              </a:ext>
+            </a:extLst>
+          </a:blip>
+          <a:stretch>
+            <a:fillRect/>
+          </a:stretch>
+        </p:blipFill>
+        <p:spPr>
+          <a:xfrm>
+            <a:off x="10884693" y="5439324"/>
+            <a:ext cx="944515" cy="779768"/>
+          </a:xfrm>
+          <a:prstGeom prst="rect">
+            <a:avLst/>
+          </a:prstGeom>
+        </p:spPr>
+      </p:pic>
+      <p:sp>
+        <p:nvSpPr>
+          <p:cNvPr id="9" name="Espace réservé du contenu 5">
+            <a:extLst>
+              <a:ext uri="{FF2B5EF4-FFF2-40B4-BE49-F238E27FC236}">
+                <a16:creationId xmlns:a16="http://schemas.microsoft.com/office/drawing/2014/main" id="{B03E24B0-0FFB-41D2-9F57-117B504B8DDB}"/>
+              </a:ext>
+            </a:extLst>
+          </p:cNvPr>
+          <p:cNvSpPr>
+            <a:spLocks noGrp="1"/>
+          </p:cNvSpPr>
+          <p:nvPr>
+            <p:ph sz="quarter" idx="13"/>
+          </p:nvPr>
+        </p:nvSpPr>
+        <p:spPr>
+          <a:xfrm>
+            <a:off x="10771188" y="5324171"/>
+            <a:ext cx="1141412" cy="824583"/>
+          </a:xfrm>
+        </p:spPr>
+        <p:txBody>
+          <a:bodyPr>
+            <a:noAutofit/>
+          </a:bodyPr>
+          <a:lstStyle>
+            <a:lvl1pPr marL="0" indent="0">
+              <a:buNone/>
+              <a:defRPr sz="1100">
+                <a:solidFill>
+                  <a:schemeClr val="accent1">
+                    <a:lumMod val="75000"/>
+                  </a:schemeClr>
+                </a:solidFill>
+                <a:latin typeface="+mn-lt"/>
+                <a:cs typeface="Calibri" panose="020F0502020204030204" pitchFamily="34" charset="0"/>
+              </a:defRPr>
+            </a:lvl1pPr>
+            <a:lvl2pPr>
+              <a:defRPr sz="1100">
+                <a:solidFill>
+                  <a:srgbClr val="E40A4A"/>
+                </a:solidFill>
+                <a:latin typeface="Calibri" panose="020F0502020204030204" pitchFamily="34" charset="0"/>
+                <a:cs typeface="Calibri" panose="020F0502020204030204" pitchFamily="34" charset="0"/>
+              </a:defRPr>
+            </a:lvl2pPr>
+            <a:lvl3pPr>
+              <a:defRPr sz="1100">
+                <a:solidFill>
+                  <a:srgbClr val="E40A4A"/>
+                </a:solidFill>
+                <a:latin typeface="Calibri" panose="020F0502020204030204" pitchFamily="34" charset="0"/>
+                <a:cs typeface="Calibri" panose="020F0502020204030204" pitchFamily="34" charset="0"/>
+              </a:defRPr>
+            </a:lvl3pPr>
+            <a:lvl4pPr>
+              <a:defRPr sz="1100">
+                <a:solidFill>
+                  <a:srgbClr val="E40A4A"/>
+                </a:solidFill>
+                <a:latin typeface="Calibri" panose="020F0502020204030204" pitchFamily="34" charset="0"/>
+                <a:cs typeface="Calibri" panose="020F0502020204030204" pitchFamily="34" charset="0"/>
+              </a:defRPr>
+            </a:lvl4pPr>
+            <a:lvl5pPr>
+              <a:defRPr sz="1100">
+                <a:solidFill>
+                  <a:srgbClr val="E40A4A"/>
+                </a:solidFill>
+                <a:latin typeface="Calibri" panose="020F0502020204030204" pitchFamily="34" charset="0"/>
+                <a:cs typeface="Calibri" panose="020F0502020204030204" pitchFamily="34" charset="0"/>
+              </a:defRPr>
+            </a:lvl5pPr>
+          </a:lstStyle>
+          <a:p>
+            <a:pPr lvl="0"/>
+            <a:r>
+              <a:rPr lang="fr-FR" dirty="0"/>
+              <a:t>Cliquez pour modifier les styles du texte du masque</a:t>
             </a:r>
           </a:p>
         </p:txBody>
@@ -11556,7 +11633,7 @@
         <p:spPr>
           <a:xfrm>
             <a:off x="860274" y="979458"/>
-            <a:ext cx="4293193" cy="468313"/>
+            <a:ext cx="9720640" cy="468313"/>
           </a:xfrm>
           <a:prstGeom prst="rect">
             <a:avLst/>
@@ -11654,7 +11731,7 @@
       </p:pic>
       <p:sp>
         <p:nvSpPr>
-          <p:cNvPr id="2" name="Title 1"/>
+          <p:cNvPr id="2" name="Title 1" descr="titre"/>
           <p:cNvSpPr>
             <a:spLocks noGrp="1"/>
           </p:cNvSpPr>
@@ -11685,64 +11762,7 @@
             </a:lvl1pPr>
           </a:lstStyle>
           <a:p>
-            <a:r>
-              <a:rPr lang="fr-FR" dirty="0"/>
-              <a:t>Modifiez le style du titre</a:t>
-            </a:r>
             <a:endParaRPr lang="en-US" dirty="0"/>
-          </a:p>
-        </p:txBody>
-      </p:sp>
-      <p:sp>
-        <p:nvSpPr>
-          <p:cNvPr id="4" name="Espace réservé du texte 3">
-            <a:extLst>
-              <a:ext uri="{FF2B5EF4-FFF2-40B4-BE49-F238E27FC236}">
-                <a16:creationId xmlns:a16="http://schemas.microsoft.com/office/drawing/2014/main" id="{D4749D67-F126-4FCA-9238-48562163B756}"/>
-              </a:ext>
-            </a:extLst>
-          </p:cNvPr>
-          <p:cNvSpPr>
-            <a:spLocks noGrp="1"/>
-          </p:cNvSpPr>
-          <p:nvPr>
-            <p:ph type="body" sz="quarter" idx="10" hasCustomPrompt="1"/>
-          </p:nvPr>
-        </p:nvSpPr>
-        <p:spPr>
-          <a:xfrm>
-            <a:off x="0" y="1174985"/>
-            <a:ext cx="1263159" cy="246827"/>
-          </a:xfrm>
-          <a:prstGeom prst="rect">
-            <a:avLst/>
-          </a:prstGeom>
-        </p:spPr>
-        <p:txBody>
-          <a:bodyPr>
-            <a:noAutofit/>
-          </a:bodyPr>
-          <a:lstStyle>
-            <a:lvl1pPr marL="0" indent="0" algn="ctr">
-              <a:buNone/>
-              <a:defRPr sz="1200"/>
-            </a:lvl1pPr>
-          </a:lstStyle>
-          <a:p>
-            <a:pPr lvl="0"/>
-            <a:r>
-              <a:rPr lang="fr-FR" dirty="0" err="1"/>
-              <a:t>Identite</a:t>
-            </a:r>
-            <a:r>
-              <a:rPr lang="fr-FR" dirty="0"/>
-              <a:t> du </a:t>
-            </a:r>
-            <a:r>
-              <a:rPr lang="fr-FR" dirty="0" err="1"/>
-              <a:t>penguin</a:t>
-            </a:r>
-            <a:endParaRPr lang="fr-FR" dirty="0"/>
           </a:p>
         </p:txBody>
       </p:sp>
@@ -11770,68 +11790,6 @@
           <a:prstGeom prst="rect">
             <a:avLst/>
           </a:prstGeom>
-        </p:spPr>
-        <p:txBody>
-          <a:bodyPr/>
-          <a:lstStyle/>
-          <a:p>
-            <a:pPr lvl="0"/>
-            <a:r>
-              <a:rPr lang="fr-FR" dirty="0"/>
-              <a:t>Cliquez pour modifier les styles du texte du masque</a:t>
-            </a:r>
-          </a:p>
-          <a:p>
-            <a:pPr lvl="1"/>
-            <a:r>
-              <a:rPr lang="fr-FR" dirty="0"/>
-              <a:t>Deuxième niveau</a:t>
-            </a:r>
-          </a:p>
-          <a:p>
-            <a:pPr lvl="2"/>
-            <a:r>
-              <a:rPr lang="fr-FR" dirty="0"/>
-              <a:t>Troisième niveau</a:t>
-            </a:r>
-          </a:p>
-          <a:p>
-            <a:pPr lvl="3"/>
-            <a:r>
-              <a:rPr lang="fr-FR" dirty="0"/>
-              <a:t>Quatrième niveau</a:t>
-            </a:r>
-          </a:p>
-          <a:p>
-            <a:pPr lvl="4"/>
-            <a:r>
-              <a:rPr lang="fr-FR" dirty="0"/>
-              <a:t>Cinquième niveau</a:t>
-            </a:r>
-          </a:p>
-        </p:txBody>
-      </p:sp>
-      <p:sp>
-        <p:nvSpPr>
-          <p:cNvPr id="13" name="Espace réservé du contenu 12">
-            <a:extLst>
-              <a:ext uri="{FF2B5EF4-FFF2-40B4-BE49-F238E27FC236}">
-                <a16:creationId xmlns:a16="http://schemas.microsoft.com/office/drawing/2014/main" id="{7B1E258A-8CA0-4E39-9E62-F7C28FDBD814}"/>
-              </a:ext>
-            </a:extLst>
-          </p:cNvPr>
-          <p:cNvSpPr>
-            <a:spLocks noGrp="1"/>
-          </p:cNvSpPr>
-          <p:nvPr>
-            <p:ph sz="quarter" idx="12"/>
-          </p:nvPr>
-        </p:nvSpPr>
-        <p:spPr>
-          <a:xfrm>
-            <a:off x="216877" y="275492"/>
-            <a:ext cx="867507" cy="803031"/>
-          </a:xfrm>
         </p:spPr>
         <p:txBody>
           <a:bodyPr/>
@@ -11958,6 +11916,130 @@
           </a:p>
         </p:txBody>
       </p:sp>
+      <p:sp>
+        <p:nvSpPr>
+          <p:cNvPr id="4" name="Espace réservé du contenu 3">
+            <a:extLst>
+              <a:ext uri="{FF2B5EF4-FFF2-40B4-BE49-F238E27FC236}">
+                <a16:creationId xmlns:a16="http://schemas.microsoft.com/office/drawing/2014/main" id="{705BE7F7-66D3-4707-BB6E-33A36E0EB35A}"/>
+              </a:ext>
+            </a:extLst>
+          </p:cNvPr>
+          <p:cNvSpPr>
+            <a:spLocks noGrp="1"/>
+          </p:cNvSpPr>
+          <p:nvPr>
+            <p:ph sz="quarter" idx="15"/>
+          </p:nvPr>
+        </p:nvSpPr>
+        <p:spPr>
+          <a:xfrm>
+            <a:off x="0" y="0"/>
+            <a:ext cx="1263650" cy="1157288"/>
+          </a:xfrm>
+        </p:spPr>
+        <p:txBody>
+          <a:bodyPr/>
+          <a:lstStyle/>
+          <a:p>
+            <a:pPr lvl="0"/>
+            <a:r>
+              <a:rPr lang="fr-FR"/>
+              <a:t>Cliquez pour modifier les styles du texte du masque</a:t>
+            </a:r>
+          </a:p>
+          <a:p>
+            <a:pPr lvl="1"/>
+            <a:r>
+              <a:rPr lang="fr-FR"/>
+              <a:t>Deuxième niveau</a:t>
+            </a:r>
+          </a:p>
+          <a:p>
+            <a:pPr lvl="2"/>
+            <a:r>
+              <a:rPr lang="fr-FR"/>
+              <a:t>Troisième niveau</a:t>
+            </a:r>
+          </a:p>
+          <a:p>
+            <a:pPr lvl="3"/>
+            <a:r>
+              <a:rPr lang="fr-FR"/>
+              <a:t>Quatrième niveau</a:t>
+            </a:r>
+          </a:p>
+          <a:p>
+            <a:pPr lvl="4"/>
+            <a:r>
+              <a:rPr lang="fr-FR"/>
+              <a:t>Cinquième niveau</a:t>
+            </a:r>
+          </a:p>
+        </p:txBody>
+      </p:sp>
+      <p:sp>
+        <p:nvSpPr>
+          <p:cNvPr id="9" name="Espace réservé du contenu 8">
+            <a:extLst>
+              <a:ext uri="{FF2B5EF4-FFF2-40B4-BE49-F238E27FC236}">
+                <a16:creationId xmlns:a16="http://schemas.microsoft.com/office/drawing/2014/main" id="{1008C411-FE6F-4A5B-8291-3D374A3E16DA}"/>
+              </a:ext>
+            </a:extLst>
+          </p:cNvPr>
+          <p:cNvSpPr>
+            <a:spLocks noGrp="1"/>
+          </p:cNvSpPr>
+          <p:nvPr>
+            <p:ph sz="quarter" idx="16"/>
+          </p:nvPr>
+        </p:nvSpPr>
+        <p:spPr>
+          <a:xfrm>
+            <a:off x="0" y="1157288"/>
+            <a:ext cx="1263650" cy="460375"/>
+          </a:xfrm>
+        </p:spPr>
+        <p:txBody>
+          <a:bodyPr/>
+          <a:lstStyle/>
+          <a:p>
+            <a:pPr lvl="0"/>
+            <a:r>
+              <a:rPr lang="fr-FR"/>
+              <a:t>Cliquez pour modifier les styles du texte du masque</a:t>
+            </a:r>
+          </a:p>
+          <a:p>
+            <a:pPr lvl="1"/>
+            <a:r>
+              <a:rPr lang="fr-FR"/>
+              <a:t>Deuxième niveau</a:t>
+            </a:r>
+          </a:p>
+          <a:p>
+            <a:pPr lvl="2"/>
+            <a:r>
+              <a:rPr lang="fr-FR"/>
+              <a:t>Troisième niveau</a:t>
+            </a:r>
+          </a:p>
+          <a:p>
+            <a:pPr lvl="3"/>
+            <a:r>
+              <a:rPr lang="fr-FR"/>
+              <a:t>Quatrième niveau</a:t>
+            </a:r>
+          </a:p>
+          <a:p>
+            <a:pPr lvl="4"/>
+            <a:r>
+              <a:rPr lang="fr-FR"/>
+              <a:t>Cinquième niveau</a:t>
+            </a:r>
+          </a:p>
+        </p:txBody>
+      </p:sp>
     </p:spTree>
     <p:extLst>
       <p:ext uri="{BB962C8B-B14F-4D97-AF65-F5344CB8AC3E}">
@@ -11972,7 +12054,7 @@
 </file>
 
 <file path=ppt/slideLayouts/slideLayout4.xml><?xml version="1.0" encoding="utf-8"?>
-<p:sldLayout xmlns:a="http://schemas.openxmlformats.org/drawingml/2006/main" xmlns:r="http://schemas.openxmlformats.org/officeDocument/2006/relationships" xmlns:p="http://schemas.openxmlformats.org/presentationml/2006/main" type="obj" preserve="1">
+<p:sldLayout xmlns:a="http://schemas.openxmlformats.org/drawingml/2006/main" xmlns:r="http://schemas.openxmlformats.org/officeDocument/2006/relationships" xmlns:p="http://schemas.openxmlformats.org/presentationml/2006/main" preserve="1" userDrawn="1">
   <p:cSld name="Titre et contenu">
     <p:spTree>
       <p:nvGrpSpPr>
@@ -12060,6 +12142,130 @@
               <a:t>Cinquième niveau</a:t>
             </a:r>
             <a:endParaRPr lang="en-US" dirty="0"/>
+          </a:p>
+        </p:txBody>
+      </p:sp>
+      <p:pic>
+        <p:nvPicPr>
+          <p:cNvPr id="4" name="Graphique 3" descr="Flèche : demi-tour horizontal">
+            <a:extLst>
+              <a:ext uri="{FF2B5EF4-FFF2-40B4-BE49-F238E27FC236}">
+                <a16:creationId xmlns:a16="http://schemas.microsoft.com/office/drawing/2014/main" id="{1184D9B8-F03E-4F47-84D3-F94F7B21FA69}"/>
+              </a:ext>
+            </a:extLst>
+          </p:cNvPr>
+          <p:cNvPicPr>
+            <a:picLocks noChangeAspect="1"/>
+          </p:cNvPicPr>
+          <p:nvPr userDrawn="1"/>
+        </p:nvPicPr>
+        <p:blipFill>
+          <a:blip r:embed="rId2">
+            <a:extLst>
+              <a:ext uri="{28A0092B-C50C-407E-A947-70E740481C1C}">
+                <a14:useLocalDpi xmlns:a14="http://schemas.microsoft.com/office/drawing/2010/main" val="0"/>
+              </a:ext>
+              <a:ext uri="{96DAC541-7B7A-43D3-8B79-37D633B846F1}">
+                <asvg:svgBlip xmlns:asvg="http://schemas.microsoft.com/office/drawing/2016/SVG/main" r:embed="rId3"/>
+              </a:ext>
+            </a:extLst>
+          </a:blip>
+          <a:stretch>
+            <a:fillRect/>
+          </a:stretch>
+        </p:blipFill>
+        <p:spPr>
+          <a:xfrm>
+            <a:off x="10884693" y="5439324"/>
+            <a:ext cx="944515" cy="779768"/>
+          </a:xfrm>
+          <a:prstGeom prst="rect">
+            <a:avLst/>
+          </a:prstGeom>
+        </p:spPr>
+      </p:pic>
+      <p:sp>
+        <p:nvSpPr>
+          <p:cNvPr id="5" name="Espace réservé du contenu 5">
+            <a:extLst>
+              <a:ext uri="{FF2B5EF4-FFF2-40B4-BE49-F238E27FC236}">
+                <a16:creationId xmlns:a16="http://schemas.microsoft.com/office/drawing/2014/main" id="{8B2AE210-A494-40BA-B20B-2B814E49DC6A}"/>
+              </a:ext>
+            </a:extLst>
+          </p:cNvPr>
+          <p:cNvSpPr>
+            <a:spLocks noGrp="1"/>
+          </p:cNvSpPr>
+          <p:nvPr>
+            <p:ph sz="quarter" idx="13"/>
+          </p:nvPr>
+        </p:nvSpPr>
+        <p:spPr>
+          <a:xfrm>
+            <a:off x="10771188" y="5324171"/>
+            <a:ext cx="1141412" cy="824583"/>
+          </a:xfrm>
+        </p:spPr>
+        <p:txBody>
+          <a:bodyPr>
+            <a:noAutofit/>
+          </a:bodyPr>
+          <a:lstStyle>
+            <a:lvl1pPr marL="0" indent="0">
+              <a:buNone/>
+              <a:defRPr sz="1100">
+                <a:solidFill>
+                  <a:schemeClr val="accent1">
+                    <a:lumMod val="75000"/>
+                  </a:schemeClr>
+                </a:solidFill>
+                <a:latin typeface="+mn-lt"/>
+                <a:cs typeface="Calibri" panose="020F0502020204030204" pitchFamily="34" charset="0"/>
+              </a:defRPr>
+            </a:lvl1pPr>
+            <a:lvl2pPr>
+              <a:defRPr sz="1100">
+                <a:solidFill>
+                  <a:srgbClr val="E40A4A"/>
+                </a:solidFill>
+                <a:latin typeface="Calibri" panose="020F0502020204030204" pitchFamily="34" charset="0"/>
+                <a:cs typeface="Calibri" panose="020F0502020204030204" pitchFamily="34" charset="0"/>
+              </a:defRPr>
+            </a:lvl2pPr>
+            <a:lvl3pPr>
+              <a:defRPr sz="1100">
+                <a:solidFill>
+                  <a:srgbClr val="E40A4A"/>
+                </a:solidFill>
+                <a:latin typeface="Calibri" panose="020F0502020204030204" pitchFamily="34" charset="0"/>
+                <a:cs typeface="Calibri" panose="020F0502020204030204" pitchFamily="34" charset="0"/>
+              </a:defRPr>
+            </a:lvl3pPr>
+            <a:lvl4pPr>
+              <a:defRPr sz="1100">
+                <a:solidFill>
+                  <a:srgbClr val="E40A4A"/>
+                </a:solidFill>
+                <a:latin typeface="Calibri" panose="020F0502020204030204" pitchFamily="34" charset="0"/>
+                <a:cs typeface="Calibri" panose="020F0502020204030204" pitchFamily="34" charset="0"/>
+              </a:defRPr>
+            </a:lvl4pPr>
+            <a:lvl5pPr>
+              <a:defRPr sz="1100">
+                <a:solidFill>
+                  <a:srgbClr val="E40A4A"/>
+                </a:solidFill>
+                <a:latin typeface="Calibri" panose="020F0502020204030204" pitchFamily="34" charset="0"/>
+                <a:cs typeface="Calibri" panose="020F0502020204030204" pitchFamily="34" charset="0"/>
+              </a:defRPr>
+            </a:lvl5pPr>
+          </a:lstStyle>
+          <a:p>
+            <a:pPr lvl="0"/>
+            <a:r>
+              <a:rPr lang="fr-FR" dirty="0"/>
+              <a:t>Cliquez pour modifier les styles du texte du masque</a:t>
+            </a:r>
           </a:p>
         </p:txBody>
       </p:sp>
@@ -21332,6 +21538,130 @@
             <a:r>
               <a:rPr lang="fr-FR" sz="2400" dirty="0"/>
               <a:t>Statut : En recherche de contrats et/ou missions à partir de décembre</a:t>
+            </a:r>
+          </a:p>
+        </p:txBody>
+      </p:sp>
+      <p:pic>
+        <p:nvPicPr>
+          <p:cNvPr id="4" name="Graphique 3" descr="Flèche : demi-tour horizontal">
+            <a:extLst>
+              <a:ext uri="{FF2B5EF4-FFF2-40B4-BE49-F238E27FC236}">
+                <a16:creationId xmlns:a16="http://schemas.microsoft.com/office/drawing/2014/main" id="{5D734DF7-690A-4301-A7EB-10C9917DFFCB}"/>
+              </a:ext>
+            </a:extLst>
+          </p:cNvPr>
+          <p:cNvPicPr>
+            <a:picLocks noChangeAspect="1"/>
+          </p:cNvPicPr>
+          <p:nvPr userDrawn="1"/>
+        </p:nvPicPr>
+        <p:blipFill>
+          <a:blip r:embed="rId2">
+            <a:extLst>
+              <a:ext uri="{28A0092B-C50C-407E-A947-70E740481C1C}">
+                <a14:useLocalDpi xmlns:a14="http://schemas.microsoft.com/office/drawing/2010/main" val="0"/>
+              </a:ext>
+              <a:ext uri="{96DAC541-7B7A-43D3-8B79-37D633B846F1}">
+                <asvg:svgBlip xmlns:asvg="http://schemas.microsoft.com/office/drawing/2016/SVG/main" r:embed="rId3"/>
+              </a:ext>
+            </a:extLst>
+          </a:blip>
+          <a:stretch>
+            <a:fillRect/>
+          </a:stretch>
+        </p:blipFill>
+        <p:spPr>
+          <a:xfrm>
+            <a:off x="10884693" y="5439324"/>
+            <a:ext cx="944515" cy="779768"/>
+          </a:xfrm>
+          <a:prstGeom prst="rect">
+            <a:avLst/>
+          </a:prstGeom>
+        </p:spPr>
+      </p:pic>
+      <p:sp>
+        <p:nvSpPr>
+          <p:cNvPr id="5" name="Espace réservé du contenu 5">
+            <a:extLst>
+              <a:ext uri="{FF2B5EF4-FFF2-40B4-BE49-F238E27FC236}">
+                <a16:creationId xmlns:a16="http://schemas.microsoft.com/office/drawing/2014/main" id="{7CB7B955-42C1-4368-A0DD-40A487B84FDA}"/>
+              </a:ext>
+            </a:extLst>
+          </p:cNvPr>
+          <p:cNvSpPr>
+            <a:spLocks noGrp="1"/>
+          </p:cNvSpPr>
+          <p:nvPr>
+            <p:ph sz="quarter" idx="13"/>
+          </p:nvPr>
+        </p:nvSpPr>
+        <p:spPr>
+          <a:xfrm>
+            <a:off x="10771188" y="5324171"/>
+            <a:ext cx="1141412" cy="824583"/>
+          </a:xfrm>
+        </p:spPr>
+        <p:txBody>
+          <a:bodyPr>
+            <a:noAutofit/>
+          </a:bodyPr>
+          <a:lstStyle>
+            <a:lvl1pPr marL="0" indent="0">
+              <a:buNone/>
+              <a:defRPr sz="1100">
+                <a:solidFill>
+                  <a:schemeClr val="accent1">
+                    <a:lumMod val="75000"/>
+                  </a:schemeClr>
+                </a:solidFill>
+                <a:latin typeface="+mn-lt"/>
+                <a:cs typeface="Calibri" panose="020F0502020204030204" pitchFamily="34" charset="0"/>
+              </a:defRPr>
+            </a:lvl1pPr>
+            <a:lvl2pPr>
+              <a:defRPr sz="1100">
+                <a:solidFill>
+                  <a:srgbClr val="E40A4A"/>
+                </a:solidFill>
+                <a:latin typeface="Calibri" panose="020F0502020204030204" pitchFamily="34" charset="0"/>
+                <a:cs typeface="Calibri" panose="020F0502020204030204" pitchFamily="34" charset="0"/>
+              </a:defRPr>
+            </a:lvl2pPr>
+            <a:lvl3pPr>
+              <a:defRPr sz="1100">
+                <a:solidFill>
+                  <a:srgbClr val="E40A4A"/>
+                </a:solidFill>
+                <a:latin typeface="Calibri" panose="020F0502020204030204" pitchFamily="34" charset="0"/>
+                <a:cs typeface="Calibri" panose="020F0502020204030204" pitchFamily="34" charset="0"/>
+              </a:defRPr>
+            </a:lvl3pPr>
+            <a:lvl4pPr>
+              <a:defRPr sz="1100">
+                <a:solidFill>
+                  <a:srgbClr val="E40A4A"/>
+                </a:solidFill>
+                <a:latin typeface="Calibri" panose="020F0502020204030204" pitchFamily="34" charset="0"/>
+                <a:cs typeface="Calibri" panose="020F0502020204030204" pitchFamily="34" charset="0"/>
+              </a:defRPr>
+            </a:lvl4pPr>
+            <a:lvl5pPr>
+              <a:defRPr sz="1100">
+                <a:solidFill>
+                  <a:srgbClr val="E40A4A"/>
+                </a:solidFill>
+                <a:latin typeface="Calibri" panose="020F0502020204030204" pitchFamily="34" charset="0"/>
+                <a:cs typeface="Calibri" panose="020F0502020204030204" pitchFamily="34" charset="0"/>
+              </a:defRPr>
+            </a:lvl5pPr>
+          </a:lstStyle>
+          <a:p>
+            <a:pPr lvl="0"/>
+            <a:r>
+              <a:rPr lang="fr-FR" dirty="0"/>
+              <a:t>Cliquez pour modifier les styles du texte du masque</a:t>
             </a:r>
           </a:p>
         </p:txBody>

</xml_diff>

<commit_message>
# article en anglais fait / avant relecture par Antoine
</commit_message>
<xml_diff>
--- a/content/post/template_rstudio_article_off.pptx
+++ b/content/post/template_rstudio_article_off.pptx
@@ -227,7 +227,7 @@
           <a:p>
             <a:fld id="{97D9A1BA-3B71-4204-B564-DAF178BB8FA2}" type="datetimeFigureOut">
               <a:rPr lang="fr-FR" smtClean="0"/>
-              <a:t>16/07/2020</a:t>
+              <a:t>22/07/2020</a:t>
             </a:fld>
             <a:endParaRPr lang="fr-FR"/>
           </a:p>
@@ -408,7 +408,7 @@
           <a:p>
             <a:fld id="{09D539D4-D68A-4633-AE87-63C75E253848}" type="datetimeFigureOut">
               <a:rPr lang="fr-FR" smtClean="0"/>
-              <a:t>16/07/2020</a:t>
+              <a:t>22/07/2020</a:t>
             </a:fld>
             <a:endParaRPr lang="fr-FR"/>
           </a:p>
@@ -10512,7 +10512,7 @@
                 </a:solidFill>
                 <a:latin typeface="+mj-lt"/>
               </a:rPr>
-              <a:t>Contacter moi !</a:t>
+              <a:t>Contactez moi !</a:t>
             </a:r>
           </a:p>
         </p:txBody>

</xml_diff>